<commit_message>
+ Game Design Storyboard + Game State controller + SFX - correcting ship shader
</commit_message>
<xml_diff>
--- a/Docs/GDD.pptx
+++ b/Docs/GDD.pptx
@@ -9547,7 +9547,23 @@
                   <a:schemeClr val="bg1"/>
                 </a:solidFill>
               </a:rPr>
-              <a:t>The epic feeling when player directly controls the mothership fighting against thousands of enemy ships in vast 3D space.</a:t>
+              <a:t>The </a:t>
+            </a:r>
+            <a:r>
+              <a:rPr lang="vi-VN" sz="2000" dirty="0" smtClean="0">
+                <a:solidFill>
+                  <a:schemeClr val="bg1"/>
+                </a:solidFill>
+              </a:rPr>
+              <a:t>epic and heroic </a:t>
+            </a:r>
+            <a:r>
+              <a:rPr lang="vi-VN" sz="2000" dirty="0" smtClean="0">
+                <a:solidFill>
+                  <a:schemeClr val="bg1"/>
+                </a:solidFill>
+              </a:rPr>
+              <a:t>feeling when player directly controls the mothership fighting against thousands of enemy ships in vast 3D space.</a:t>
             </a:r>
           </a:p>
           <a:p>
@@ -10193,7 +10209,7 @@
         </p:blipFill>
         <p:spPr bwMode="auto">
           <a:xfrm>
-            <a:off x="3347864" y="1484784"/>
+            <a:off x="3321258" y="1484784"/>
             <a:ext cx="2376264" cy="1331857"/>
           </a:xfrm>
           <a:prstGeom prst="rect">
@@ -10259,6 +10275,390 @@
           <a:xfrm>
             <a:off x="6228184" y="1484784"/>
             <a:ext cx="2376264" cy="1331858"/>
+          </a:xfrm>
+          <a:prstGeom prst="rect">
+            <a:avLst/>
+          </a:prstGeom>
+          <a:noFill/>
+          <a:ln>
+            <a:noFill/>
+          </a:ln>
+          <a:effectLst/>
+          <a:extLst>
+            <a:ext uri="{909E8E84-426E-40DD-AFC4-6F175D3DCCD1}">
+              <a14:hiddenFill xmlns:a14="http://schemas.microsoft.com/office/drawing/2010/main">
+                <a:solidFill>
+                  <a:schemeClr val="accent1"/>
+                </a:solidFill>
+              </a14:hiddenFill>
+            </a:ext>
+            <a:ext uri="{91240B29-F687-4F45-9708-019B960494DF}">
+              <a14:hiddenLine xmlns:a14="http://schemas.microsoft.com/office/drawing/2010/main" w="9525">
+                <a:solidFill>
+                  <a:schemeClr val="tx1"/>
+                </a:solidFill>
+                <a:miter lim="800000"/>
+                <a:headEnd/>
+                <a:tailEnd/>
+              </a14:hiddenLine>
+            </a:ext>
+            <a:ext uri="{AF507438-7753-43E0-B8FC-AC1667EBCBE1}">
+              <a14:hiddenEffects xmlns:a14="http://schemas.microsoft.com/office/drawing/2010/main">
+                <a:effectLst>
+                  <a:outerShdw dist="35921" dir="2700000" algn="ctr" rotWithShape="0">
+                    <a:schemeClr val="bg2"/>
+                  </a:outerShdw>
+                </a:effectLst>
+              </a14:hiddenEffects>
+            </a:ext>
+          </a:extLst>
+        </p:spPr>
+      </p:pic>
+      <p:pic>
+        <p:nvPicPr>
+          <p:cNvPr id="3" name="Picture 2"/>
+          <p:cNvPicPr>
+            <a:picLocks noChangeAspect="1" noChangeArrowheads="1"/>
+          </p:cNvPicPr>
+          <p:nvPr/>
+        </p:nvPicPr>
+        <p:blipFill>
+          <a:blip r:embed="rId5">
+            <a:extLst>
+              <a:ext uri="{28A0092B-C50C-407E-A947-70E740481C1C}">
+                <a14:useLocalDpi xmlns:a14="http://schemas.microsoft.com/office/drawing/2010/main" val="0"/>
+              </a:ext>
+            </a:extLst>
+          </a:blip>
+          <a:srcRect/>
+          <a:stretch>
+            <a:fillRect/>
+          </a:stretch>
+        </p:blipFill>
+        <p:spPr bwMode="auto">
+          <a:xfrm>
+            <a:off x="467544" y="2924944"/>
+            <a:ext cx="2376263" cy="1331857"/>
+          </a:xfrm>
+          <a:prstGeom prst="rect">
+            <a:avLst/>
+          </a:prstGeom>
+          <a:noFill/>
+          <a:ln>
+            <a:noFill/>
+          </a:ln>
+          <a:effectLst/>
+          <a:extLst>
+            <a:ext uri="{909E8E84-426E-40DD-AFC4-6F175D3DCCD1}">
+              <a14:hiddenFill xmlns:a14="http://schemas.microsoft.com/office/drawing/2010/main">
+                <a:solidFill>
+                  <a:schemeClr val="accent1"/>
+                </a:solidFill>
+              </a14:hiddenFill>
+            </a:ext>
+            <a:ext uri="{91240B29-F687-4F45-9708-019B960494DF}">
+              <a14:hiddenLine xmlns:a14="http://schemas.microsoft.com/office/drawing/2010/main" w="9525">
+                <a:solidFill>
+                  <a:schemeClr val="tx1"/>
+                </a:solidFill>
+                <a:miter lim="800000"/>
+                <a:headEnd/>
+                <a:tailEnd/>
+              </a14:hiddenLine>
+            </a:ext>
+            <a:ext uri="{AF507438-7753-43E0-B8FC-AC1667EBCBE1}">
+              <a14:hiddenEffects xmlns:a14="http://schemas.microsoft.com/office/drawing/2010/main">
+                <a:effectLst>
+                  <a:outerShdw dist="35921" dir="2700000" algn="ctr" rotWithShape="0">
+                    <a:schemeClr val="bg2"/>
+                  </a:outerShdw>
+                </a:effectLst>
+              </a14:hiddenEffects>
+            </a:ext>
+          </a:extLst>
+        </p:spPr>
+      </p:pic>
+      <p:pic>
+        <p:nvPicPr>
+          <p:cNvPr id="4" name="Picture 3"/>
+          <p:cNvPicPr>
+            <a:picLocks noChangeAspect="1" noChangeArrowheads="1"/>
+          </p:cNvPicPr>
+          <p:nvPr/>
+        </p:nvPicPr>
+        <p:blipFill>
+          <a:blip r:embed="rId6">
+            <a:extLst>
+              <a:ext uri="{28A0092B-C50C-407E-A947-70E740481C1C}">
+                <a14:useLocalDpi xmlns:a14="http://schemas.microsoft.com/office/drawing/2010/main" val="0"/>
+              </a:ext>
+            </a:extLst>
+          </a:blip>
+          <a:srcRect/>
+          <a:stretch>
+            <a:fillRect/>
+          </a:stretch>
+        </p:blipFill>
+        <p:spPr bwMode="auto">
+          <a:xfrm>
+            <a:off x="3313722" y="2924944"/>
+            <a:ext cx="2376263" cy="1331857"/>
+          </a:xfrm>
+          <a:prstGeom prst="rect">
+            <a:avLst/>
+          </a:prstGeom>
+          <a:noFill/>
+          <a:ln>
+            <a:noFill/>
+          </a:ln>
+          <a:effectLst/>
+          <a:extLst>
+            <a:ext uri="{909E8E84-426E-40DD-AFC4-6F175D3DCCD1}">
+              <a14:hiddenFill xmlns:a14="http://schemas.microsoft.com/office/drawing/2010/main">
+                <a:solidFill>
+                  <a:schemeClr val="accent1"/>
+                </a:solidFill>
+              </a14:hiddenFill>
+            </a:ext>
+            <a:ext uri="{91240B29-F687-4F45-9708-019B960494DF}">
+              <a14:hiddenLine xmlns:a14="http://schemas.microsoft.com/office/drawing/2010/main" w="9525">
+                <a:solidFill>
+                  <a:schemeClr val="tx1"/>
+                </a:solidFill>
+                <a:miter lim="800000"/>
+                <a:headEnd/>
+                <a:tailEnd/>
+              </a14:hiddenLine>
+            </a:ext>
+            <a:ext uri="{AF507438-7753-43E0-B8FC-AC1667EBCBE1}">
+              <a14:hiddenEffects xmlns:a14="http://schemas.microsoft.com/office/drawing/2010/main">
+                <a:effectLst>
+                  <a:outerShdw dist="35921" dir="2700000" algn="ctr" rotWithShape="0">
+                    <a:schemeClr val="bg2"/>
+                  </a:outerShdw>
+                </a:effectLst>
+              </a14:hiddenEffects>
+            </a:ext>
+          </a:extLst>
+        </p:spPr>
+      </p:pic>
+      <p:pic>
+        <p:nvPicPr>
+          <p:cNvPr id="5" name="Picture 4"/>
+          <p:cNvPicPr>
+            <a:picLocks noChangeAspect="1" noChangeArrowheads="1"/>
+          </p:cNvPicPr>
+          <p:nvPr/>
+        </p:nvPicPr>
+        <p:blipFill>
+          <a:blip r:embed="rId7">
+            <a:extLst>
+              <a:ext uri="{28A0092B-C50C-407E-A947-70E740481C1C}">
+                <a14:useLocalDpi xmlns:a14="http://schemas.microsoft.com/office/drawing/2010/main" val="0"/>
+              </a:ext>
+            </a:extLst>
+          </a:blip>
+          <a:srcRect/>
+          <a:stretch>
+            <a:fillRect/>
+          </a:stretch>
+        </p:blipFill>
+        <p:spPr bwMode="auto">
+          <a:xfrm>
+            <a:off x="6228184" y="2924944"/>
+            <a:ext cx="2376457" cy="1331966"/>
+          </a:xfrm>
+          <a:prstGeom prst="rect">
+            <a:avLst/>
+          </a:prstGeom>
+          <a:noFill/>
+          <a:ln>
+            <a:noFill/>
+          </a:ln>
+          <a:effectLst/>
+          <a:extLst>
+            <a:ext uri="{909E8E84-426E-40DD-AFC4-6F175D3DCCD1}">
+              <a14:hiddenFill xmlns:a14="http://schemas.microsoft.com/office/drawing/2010/main">
+                <a:solidFill>
+                  <a:schemeClr val="accent1"/>
+                </a:solidFill>
+              </a14:hiddenFill>
+            </a:ext>
+            <a:ext uri="{91240B29-F687-4F45-9708-019B960494DF}">
+              <a14:hiddenLine xmlns:a14="http://schemas.microsoft.com/office/drawing/2010/main" w="9525">
+                <a:solidFill>
+                  <a:schemeClr val="tx1"/>
+                </a:solidFill>
+                <a:miter lim="800000"/>
+                <a:headEnd/>
+                <a:tailEnd/>
+              </a14:hiddenLine>
+            </a:ext>
+            <a:ext uri="{AF507438-7753-43E0-B8FC-AC1667EBCBE1}">
+              <a14:hiddenEffects xmlns:a14="http://schemas.microsoft.com/office/drawing/2010/main">
+                <a:effectLst>
+                  <a:outerShdw dist="35921" dir="2700000" algn="ctr" rotWithShape="0">
+                    <a:schemeClr val="bg2"/>
+                  </a:outerShdw>
+                </a:effectLst>
+              </a14:hiddenEffects>
+            </a:ext>
+          </a:extLst>
+        </p:spPr>
+      </p:pic>
+      <p:pic>
+        <p:nvPicPr>
+          <p:cNvPr id="1030" name="Picture 6"/>
+          <p:cNvPicPr>
+            <a:picLocks noChangeAspect="1" noChangeArrowheads="1"/>
+          </p:cNvPicPr>
+          <p:nvPr/>
+        </p:nvPicPr>
+        <p:blipFill>
+          <a:blip r:embed="rId8">
+            <a:extLst>
+              <a:ext uri="{28A0092B-C50C-407E-A947-70E740481C1C}">
+                <a14:useLocalDpi xmlns:a14="http://schemas.microsoft.com/office/drawing/2010/main" val="0"/>
+              </a:ext>
+            </a:extLst>
+          </a:blip>
+          <a:srcRect/>
+          <a:stretch>
+            <a:fillRect/>
+          </a:stretch>
+        </p:blipFill>
+        <p:spPr bwMode="auto">
+          <a:xfrm>
+            <a:off x="467545" y="4365104"/>
+            <a:ext cx="2376263" cy="1331857"/>
+          </a:xfrm>
+          <a:prstGeom prst="rect">
+            <a:avLst/>
+          </a:prstGeom>
+          <a:noFill/>
+          <a:ln>
+            <a:noFill/>
+          </a:ln>
+          <a:effectLst/>
+          <a:extLst>
+            <a:ext uri="{909E8E84-426E-40DD-AFC4-6F175D3DCCD1}">
+              <a14:hiddenFill xmlns:a14="http://schemas.microsoft.com/office/drawing/2010/main">
+                <a:solidFill>
+                  <a:schemeClr val="accent1"/>
+                </a:solidFill>
+              </a14:hiddenFill>
+            </a:ext>
+            <a:ext uri="{91240B29-F687-4F45-9708-019B960494DF}">
+              <a14:hiddenLine xmlns:a14="http://schemas.microsoft.com/office/drawing/2010/main" w="9525">
+                <a:solidFill>
+                  <a:schemeClr val="tx1"/>
+                </a:solidFill>
+                <a:miter lim="800000"/>
+                <a:headEnd/>
+                <a:tailEnd/>
+              </a14:hiddenLine>
+            </a:ext>
+            <a:ext uri="{AF507438-7753-43E0-B8FC-AC1667EBCBE1}">
+              <a14:hiddenEffects xmlns:a14="http://schemas.microsoft.com/office/drawing/2010/main">
+                <a:effectLst>
+                  <a:outerShdw dist="35921" dir="2700000" algn="ctr" rotWithShape="0">
+                    <a:schemeClr val="bg2"/>
+                  </a:outerShdw>
+                </a:effectLst>
+              </a14:hiddenEffects>
+            </a:ext>
+          </a:extLst>
+        </p:spPr>
+      </p:pic>
+      <p:pic>
+        <p:nvPicPr>
+          <p:cNvPr id="1031" name="Picture 7"/>
+          <p:cNvPicPr>
+            <a:picLocks noChangeAspect="1" noChangeArrowheads="1"/>
+          </p:cNvPicPr>
+          <p:nvPr/>
+        </p:nvPicPr>
+        <p:blipFill>
+          <a:blip r:embed="rId9">
+            <a:extLst>
+              <a:ext uri="{28A0092B-C50C-407E-A947-70E740481C1C}">
+                <a14:useLocalDpi xmlns:a14="http://schemas.microsoft.com/office/drawing/2010/main" val="0"/>
+              </a:ext>
+            </a:extLst>
+          </a:blip>
+          <a:srcRect/>
+          <a:stretch>
+            <a:fillRect/>
+          </a:stretch>
+        </p:blipFill>
+        <p:spPr bwMode="auto">
+          <a:xfrm>
+            <a:off x="3313721" y="4365104"/>
+            <a:ext cx="2376263" cy="1331857"/>
+          </a:xfrm>
+          <a:prstGeom prst="rect">
+            <a:avLst/>
+          </a:prstGeom>
+          <a:noFill/>
+          <a:ln>
+            <a:noFill/>
+          </a:ln>
+          <a:effectLst/>
+          <a:extLst>
+            <a:ext uri="{909E8E84-426E-40DD-AFC4-6F175D3DCCD1}">
+              <a14:hiddenFill xmlns:a14="http://schemas.microsoft.com/office/drawing/2010/main">
+                <a:solidFill>
+                  <a:schemeClr val="accent1"/>
+                </a:solidFill>
+              </a14:hiddenFill>
+            </a:ext>
+            <a:ext uri="{91240B29-F687-4F45-9708-019B960494DF}">
+              <a14:hiddenLine xmlns:a14="http://schemas.microsoft.com/office/drawing/2010/main" w="9525">
+                <a:solidFill>
+                  <a:schemeClr val="tx1"/>
+                </a:solidFill>
+                <a:miter lim="800000"/>
+                <a:headEnd/>
+                <a:tailEnd/>
+              </a14:hiddenLine>
+            </a:ext>
+            <a:ext uri="{AF507438-7753-43E0-B8FC-AC1667EBCBE1}">
+              <a14:hiddenEffects xmlns:a14="http://schemas.microsoft.com/office/drawing/2010/main">
+                <a:effectLst>
+                  <a:outerShdw dist="35921" dir="2700000" algn="ctr" rotWithShape="0">
+                    <a:schemeClr val="bg2"/>
+                  </a:outerShdw>
+                </a:effectLst>
+              </a14:hiddenEffects>
+            </a:ext>
+          </a:extLst>
+        </p:spPr>
+      </p:pic>
+      <p:pic>
+        <p:nvPicPr>
+          <p:cNvPr id="1033" name="Picture 9"/>
+          <p:cNvPicPr>
+            <a:picLocks noChangeAspect="1" noChangeArrowheads="1"/>
+          </p:cNvPicPr>
+          <p:nvPr/>
+        </p:nvPicPr>
+        <p:blipFill>
+          <a:blip r:embed="rId10">
+            <a:extLst>
+              <a:ext uri="{28A0092B-C50C-407E-A947-70E740481C1C}">
+                <a14:useLocalDpi xmlns:a14="http://schemas.microsoft.com/office/drawing/2010/main" val="0"/>
+              </a:ext>
+            </a:extLst>
+          </a:blip>
+          <a:srcRect/>
+          <a:stretch>
+            <a:fillRect/>
+          </a:stretch>
+        </p:blipFill>
+        <p:spPr bwMode="auto">
+          <a:xfrm>
+            <a:off x="6197874" y="4341057"/>
+            <a:ext cx="2419167" cy="1355904"/>
           </a:xfrm>
           <a:prstGeom prst="rect">
             <a:avLst/>

</xml_diff>

<commit_message>
+ add sounds - tweak the scene + finalize GDD
</commit_message>
<xml_diff>
--- a/Docs/GDD.pptx
+++ b/Docs/GDD.pptx
@@ -10,6 +10,14 @@
     <p:sldId id="258" r:id="rId4"/>
     <p:sldId id="259" r:id="rId5"/>
     <p:sldId id="260" r:id="rId6"/>
+    <p:sldId id="261" r:id="rId7"/>
+    <p:sldId id="262" r:id="rId8"/>
+    <p:sldId id="263" r:id="rId9"/>
+    <p:sldId id="264" r:id="rId10"/>
+    <p:sldId id="265" r:id="rId11"/>
+    <p:sldId id="266" r:id="rId12"/>
+    <p:sldId id="267" r:id="rId13"/>
+    <p:sldId id="268" r:id="rId14"/>
   </p:sldIdLst>
   <p:sldSz cx="9144000" cy="6858000" type="screen4x3"/>
   <p:notesSz cx="6858000" cy="9144000"/>
@@ -6251,7 +6259,7 @@
           <a:p>
             <a:fld id="{8AD142DB-104C-4571-A9DF-CD2FD65DE80D}" type="datetimeFigureOut">
               <a:rPr lang="vi-VN" smtClean="0"/>
-              <a:t>02/07/2014</a:t>
+              <a:t>08/07/2014</a:t>
             </a:fld>
             <a:endParaRPr lang="vi-VN"/>
           </a:p>
@@ -6421,7 +6429,7 @@
           <a:p>
             <a:fld id="{8AD142DB-104C-4571-A9DF-CD2FD65DE80D}" type="datetimeFigureOut">
               <a:rPr lang="vi-VN" smtClean="0"/>
-              <a:t>02/07/2014</a:t>
+              <a:t>08/07/2014</a:t>
             </a:fld>
             <a:endParaRPr lang="vi-VN"/>
           </a:p>
@@ -6601,7 +6609,7 @@
           <a:p>
             <a:fld id="{8AD142DB-104C-4571-A9DF-CD2FD65DE80D}" type="datetimeFigureOut">
               <a:rPr lang="vi-VN" smtClean="0"/>
-              <a:t>02/07/2014</a:t>
+              <a:t>08/07/2014</a:t>
             </a:fld>
             <a:endParaRPr lang="vi-VN"/>
           </a:p>
@@ -6771,7 +6779,7 @@
           <a:p>
             <a:fld id="{8AD142DB-104C-4571-A9DF-CD2FD65DE80D}" type="datetimeFigureOut">
               <a:rPr lang="vi-VN" smtClean="0"/>
-              <a:t>02/07/2014</a:t>
+              <a:t>08/07/2014</a:t>
             </a:fld>
             <a:endParaRPr lang="vi-VN"/>
           </a:p>
@@ -7017,7 +7025,7 @@
           <a:p>
             <a:fld id="{8AD142DB-104C-4571-A9DF-CD2FD65DE80D}" type="datetimeFigureOut">
               <a:rPr lang="vi-VN" smtClean="0"/>
-              <a:t>02/07/2014</a:t>
+              <a:t>08/07/2014</a:t>
             </a:fld>
             <a:endParaRPr lang="vi-VN"/>
           </a:p>
@@ -7305,7 +7313,7 @@
           <a:p>
             <a:fld id="{8AD142DB-104C-4571-A9DF-CD2FD65DE80D}" type="datetimeFigureOut">
               <a:rPr lang="vi-VN" smtClean="0"/>
-              <a:t>02/07/2014</a:t>
+              <a:t>08/07/2014</a:t>
             </a:fld>
             <a:endParaRPr lang="vi-VN"/>
           </a:p>
@@ -7727,7 +7735,7 @@
           <a:p>
             <a:fld id="{8AD142DB-104C-4571-A9DF-CD2FD65DE80D}" type="datetimeFigureOut">
               <a:rPr lang="vi-VN" smtClean="0"/>
-              <a:t>02/07/2014</a:t>
+              <a:t>08/07/2014</a:t>
             </a:fld>
             <a:endParaRPr lang="vi-VN"/>
           </a:p>
@@ -7845,7 +7853,7 @@
           <a:p>
             <a:fld id="{8AD142DB-104C-4571-A9DF-CD2FD65DE80D}" type="datetimeFigureOut">
               <a:rPr lang="vi-VN" smtClean="0"/>
-              <a:t>02/07/2014</a:t>
+              <a:t>08/07/2014</a:t>
             </a:fld>
             <a:endParaRPr lang="vi-VN"/>
           </a:p>
@@ -7940,7 +7948,7 @@
           <a:p>
             <a:fld id="{8AD142DB-104C-4571-A9DF-CD2FD65DE80D}" type="datetimeFigureOut">
               <a:rPr lang="vi-VN" smtClean="0"/>
-              <a:t>02/07/2014</a:t>
+              <a:t>08/07/2014</a:t>
             </a:fld>
             <a:endParaRPr lang="vi-VN"/>
           </a:p>
@@ -8217,7 +8225,7 @@
           <a:p>
             <a:fld id="{8AD142DB-104C-4571-A9DF-CD2FD65DE80D}" type="datetimeFigureOut">
               <a:rPr lang="vi-VN" smtClean="0"/>
-              <a:t>02/07/2014</a:t>
+              <a:t>08/07/2014</a:t>
             </a:fld>
             <a:endParaRPr lang="vi-VN"/>
           </a:p>
@@ -8470,7 +8478,7 @@
           <a:p>
             <a:fld id="{8AD142DB-104C-4571-A9DF-CD2FD65DE80D}" type="datetimeFigureOut">
               <a:rPr lang="vi-VN" smtClean="0"/>
-              <a:t>02/07/2014</a:t>
+              <a:t>08/07/2014</a:t>
             </a:fld>
             <a:endParaRPr lang="vi-VN"/>
           </a:p>
@@ -8683,7 +8691,7 @@
           <a:p>
             <a:fld id="{8AD142DB-104C-4571-A9DF-CD2FD65DE80D}" type="datetimeFigureOut">
               <a:rPr lang="vi-VN" smtClean="0"/>
-              <a:t>02/07/2014</a:t>
+              <a:t>08/07/2014</a:t>
             </a:fld>
             <a:endParaRPr lang="vi-VN"/>
           </a:p>
@@ -9247,6 +9255,345 @@
 </p:sld>
 </file>
 
+<file path=ppt/slides/slide10.xml><?xml version="1.0" encoding="utf-8"?>
+<p:sld xmlns:a="http://schemas.openxmlformats.org/drawingml/2006/main" xmlns:r="http://schemas.openxmlformats.org/officeDocument/2006/relationships" xmlns:p="http://schemas.openxmlformats.org/presentationml/2006/main">
+  <p:cSld>
+    <p:spTree>
+      <p:nvGrpSpPr>
+        <p:cNvPr id="1" name=""/>
+        <p:cNvGrpSpPr/>
+        <p:nvPr/>
+      </p:nvGrpSpPr>
+      <p:grpSpPr>
+        <a:xfrm>
+          <a:off x="0" y="0"/>
+          <a:ext cx="0" cy="0"/>
+          <a:chOff x="0" y="0"/>
+          <a:chExt cx="0" cy="0"/>
+        </a:xfrm>
+      </p:grpSpPr>
+      <p:sp>
+        <p:nvSpPr>
+          <p:cNvPr id="2" name="Title 1"/>
+          <p:cNvSpPr>
+            <a:spLocks noGrp="1"/>
+          </p:cNvSpPr>
+          <p:nvPr>
+            <p:ph type="title"/>
+          </p:nvPr>
+        </p:nvSpPr>
+        <p:spPr/>
+        <p:txBody>
+          <a:bodyPr/>
+          <a:lstStyle/>
+          <a:p>
+            <a:r>
+              <a:rPr lang="en-US" dirty="0" smtClean="0"/>
+              <a:t>The economic fun</a:t>
+            </a:r>
+            <a:endParaRPr lang="vi-VN" dirty="0"/>
+          </a:p>
+        </p:txBody>
+      </p:sp>
+      <p:sp>
+        <p:nvSpPr>
+          <p:cNvPr id="3" name="Content Placeholder 2"/>
+          <p:cNvSpPr>
+            <a:spLocks noGrp="1"/>
+          </p:cNvSpPr>
+          <p:nvPr>
+            <p:ph idx="1"/>
+          </p:nvPr>
+        </p:nvSpPr>
+        <p:spPr/>
+        <p:txBody>
+          <a:bodyPr>
+            <a:normAutofit/>
+          </a:bodyPr>
+          <a:lstStyle/>
+          <a:p>
+            <a:r>
+              <a:rPr lang="en-US" dirty="0" smtClean="0"/>
+              <a:t>Players receive missions at planets. Accomplishing missions to earn credits.</a:t>
+            </a:r>
+          </a:p>
+          <a:p>
+            <a:r>
+              <a:rPr lang="en-US" dirty="0" smtClean="0"/>
+              <a:t>Players use credits to purchase and upgrade ships.</a:t>
+            </a:r>
+          </a:p>
+          <a:p>
+            <a:r>
+              <a:rPr lang="en-US" dirty="0" smtClean="0"/>
+              <a:t>With stronger fleets, players can explore deeper into space for fame and glory (to have their names in the leaderboard).</a:t>
+            </a:r>
+          </a:p>
+          <a:p>
+            <a:r>
+              <a:rPr lang="en-US" dirty="0" smtClean="0"/>
+              <a:t>Players can buy credits with </a:t>
+            </a:r>
+            <a:r>
+              <a:rPr lang="en-US" b="1" i="1" dirty="0" smtClean="0"/>
+              <a:t>real money.</a:t>
+            </a:r>
+            <a:endParaRPr lang="vi-VN" dirty="0"/>
+          </a:p>
+        </p:txBody>
+      </p:sp>
+    </p:spTree>
+    <p:extLst>
+      <p:ext uri="{BB962C8B-B14F-4D97-AF65-F5344CB8AC3E}">
+        <p14:creationId xmlns:p14="http://schemas.microsoft.com/office/powerpoint/2010/main" val="4111058006"/>
+      </p:ext>
+    </p:extLst>
+  </p:cSld>
+  <p:clrMapOvr>
+    <a:masterClrMapping/>
+  </p:clrMapOvr>
+</p:sld>
+</file>
+
+<file path=ppt/slides/slide11.xml><?xml version="1.0" encoding="utf-8"?>
+<p:sld xmlns:a="http://schemas.openxmlformats.org/drawingml/2006/main" xmlns:r="http://schemas.openxmlformats.org/officeDocument/2006/relationships" xmlns:p="http://schemas.openxmlformats.org/presentationml/2006/main">
+  <p:cSld>
+    <p:spTree>
+      <p:nvGrpSpPr>
+        <p:cNvPr id="1" name=""/>
+        <p:cNvGrpSpPr/>
+        <p:nvPr/>
+      </p:nvGrpSpPr>
+      <p:grpSpPr>
+        <a:xfrm>
+          <a:off x="0" y="0"/>
+          <a:ext cx="0" cy="0"/>
+          <a:chOff x="0" y="0"/>
+          <a:chExt cx="0" cy="0"/>
+        </a:xfrm>
+      </p:grpSpPr>
+      <p:sp>
+        <p:nvSpPr>
+          <p:cNvPr id="2" name="Title 1"/>
+          <p:cNvSpPr>
+            <a:spLocks noGrp="1"/>
+          </p:cNvSpPr>
+          <p:nvPr>
+            <p:ph type="title"/>
+          </p:nvPr>
+        </p:nvSpPr>
+        <p:spPr/>
+        <p:txBody>
+          <a:bodyPr/>
+          <a:lstStyle/>
+          <a:p>
+            <a:r>
+              <a:rPr lang="en-US" dirty="0" smtClean="0"/>
+              <a:t>Danger and opportunities</a:t>
+            </a:r>
+            <a:endParaRPr lang="vi-VN" dirty="0"/>
+          </a:p>
+        </p:txBody>
+      </p:sp>
+      <p:sp>
+        <p:nvSpPr>
+          <p:cNvPr id="3" name="Content Placeholder 2"/>
+          <p:cNvSpPr>
+            <a:spLocks noGrp="1"/>
+          </p:cNvSpPr>
+          <p:nvPr>
+            <p:ph idx="1"/>
+          </p:nvPr>
+        </p:nvSpPr>
+        <p:spPr/>
+        <p:txBody>
+          <a:bodyPr/>
+          <a:lstStyle/>
+          <a:p>
+            <a:r>
+              <a:rPr lang="en-US" dirty="0" smtClean="0"/>
+              <a:t>Players can encounter random or designated battles everywhere in space.</a:t>
+            </a:r>
+          </a:p>
+          <a:p>
+            <a:r>
+              <a:rPr lang="en-US" dirty="0" smtClean="0"/>
+              <a:t>The primary purpose of the game is to destroy bosses. Battles with bosses are not easy and require strong investment.</a:t>
+            </a:r>
+          </a:p>
+          <a:p>
+            <a:r>
+              <a:rPr lang="en-US" dirty="0" smtClean="0"/>
+              <a:t>The game records player’s achievements and praise them on a polished leaderboard to encourage players to keep on playing.</a:t>
+            </a:r>
+            <a:endParaRPr lang="vi-VN" dirty="0"/>
+          </a:p>
+        </p:txBody>
+      </p:sp>
+    </p:spTree>
+    <p:extLst>
+      <p:ext uri="{BB962C8B-B14F-4D97-AF65-F5344CB8AC3E}">
+        <p14:creationId xmlns:p14="http://schemas.microsoft.com/office/powerpoint/2010/main" val="2665234055"/>
+      </p:ext>
+    </p:extLst>
+  </p:cSld>
+  <p:clrMapOvr>
+    <a:masterClrMapping/>
+  </p:clrMapOvr>
+</p:sld>
+</file>
+
+<file path=ppt/slides/slide12.xml><?xml version="1.0" encoding="utf-8"?>
+<p:sld xmlns:a="http://schemas.openxmlformats.org/drawingml/2006/main" xmlns:r="http://schemas.openxmlformats.org/officeDocument/2006/relationships" xmlns:p="http://schemas.openxmlformats.org/presentationml/2006/main">
+  <p:cSld>
+    <p:spTree>
+      <p:nvGrpSpPr>
+        <p:cNvPr id="1" name=""/>
+        <p:cNvGrpSpPr/>
+        <p:nvPr/>
+      </p:nvGrpSpPr>
+      <p:grpSpPr>
+        <a:xfrm>
+          <a:off x="0" y="0"/>
+          <a:ext cx="0" cy="0"/>
+          <a:chOff x="0" y="0"/>
+          <a:chExt cx="0" cy="0"/>
+        </a:xfrm>
+      </p:grpSpPr>
+      <p:sp>
+        <p:nvSpPr>
+          <p:cNvPr id="2" name="Title 1"/>
+          <p:cNvSpPr>
+            <a:spLocks noGrp="1"/>
+          </p:cNvSpPr>
+          <p:nvPr>
+            <p:ph type="title"/>
+          </p:nvPr>
+        </p:nvSpPr>
+        <p:spPr/>
+        <p:txBody>
+          <a:bodyPr/>
+          <a:lstStyle/>
+          <a:p>
+            <a:r>
+              <a:rPr lang="en-US" dirty="0" smtClean="0"/>
+              <a:t>Tricks and treats</a:t>
+            </a:r>
+            <a:endParaRPr lang="vi-VN" dirty="0"/>
+          </a:p>
+        </p:txBody>
+      </p:sp>
+      <p:sp>
+        <p:nvSpPr>
+          <p:cNvPr id="3" name="Content Placeholder 2"/>
+          <p:cNvSpPr>
+            <a:spLocks noGrp="1"/>
+          </p:cNvSpPr>
+          <p:nvPr>
+            <p:ph idx="1"/>
+          </p:nvPr>
+        </p:nvSpPr>
+        <p:spPr/>
+        <p:txBody>
+          <a:bodyPr/>
+          <a:lstStyle/>
+          <a:p>
+            <a:r>
+              <a:rPr lang="en-US" dirty="0" smtClean="0"/>
+              <a:t>Players can hinder others by releasing some of their ships as pirates. This provides the thrill of interacting with other players though indirectly.</a:t>
+            </a:r>
+          </a:p>
+        </p:txBody>
+      </p:sp>
+    </p:spTree>
+    <p:extLst>
+      <p:ext uri="{BB962C8B-B14F-4D97-AF65-F5344CB8AC3E}">
+        <p14:creationId xmlns:p14="http://schemas.microsoft.com/office/powerpoint/2010/main" val="3593080268"/>
+      </p:ext>
+    </p:extLst>
+  </p:cSld>
+  <p:clrMapOvr>
+    <a:masterClrMapping/>
+  </p:clrMapOvr>
+</p:sld>
+</file>
+
+<file path=ppt/slides/slide13.xml><?xml version="1.0" encoding="utf-8"?>
+<p:sld xmlns:a="http://schemas.openxmlformats.org/drawingml/2006/main" xmlns:r="http://schemas.openxmlformats.org/officeDocument/2006/relationships" xmlns:p="http://schemas.openxmlformats.org/presentationml/2006/main">
+  <p:cSld>
+    <p:spTree>
+      <p:nvGrpSpPr>
+        <p:cNvPr id="1" name=""/>
+        <p:cNvGrpSpPr/>
+        <p:nvPr/>
+      </p:nvGrpSpPr>
+      <p:grpSpPr>
+        <a:xfrm>
+          <a:off x="0" y="0"/>
+          <a:ext cx="0" cy="0"/>
+          <a:chOff x="0" y="0"/>
+          <a:chExt cx="0" cy="0"/>
+        </a:xfrm>
+      </p:grpSpPr>
+      <p:sp>
+        <p:nvSpPr>
+          <p:cNvPr id="2" name="Title 1"/>
+          <p:cNvSpPr>
+            <a:spLocks noGrp="1"/>
+          </p:cNvSpPr>
+          <p:nvPr>
+            <p:ph type="ctrTitle"/>
+          </p:nvPr>
+        </p:nvSpPr>
+        <p:spPr/>
+        <p:txBody>
+          <a:bodyPr/>
+          <a:lstStyle/>
+          <a:p>
+            <a:r>
+              <a:rPr lang="en-US" dirty="0" smtClean="0"/>
+              <a:t>Thank you for reading!</a:t>
+            </a:r>
+            <a:endParaRPr lang="vi-VN" dirty="0"/>
+          </a:p>
+        </p:txBody>
+      </p:sp>
+      <p:sp>
+        <p:nvSpPr>
+          <p:cNvPr id="4" name="Subtitle 3"/>
+          <p:cNvSpPr>
+            <a:spLocks noGrp="1"/>
+          </p:cNvSpPr>
+          <p:nvPr>
+            <p:ph type="subTitle" idx="1"/>
+          </p:nvPr>
+        </p:nvSpPr>
+        <p:spPr/>
+        <p:txBody>
+          <a:bodyPr/>
+          <a:lstStyle/>
+          <a:p>
+            <a:r>
+              <a:rPr lang="en-US" dirty="0" smtClean="0"/>
+              <a:t>Please try the demo.</a:t>
+            </a:r>
+            <a:endParaRPr lang="vi-VN" dirty="0"/>
+          </a:p>
+        </p:txBody>
+      </p:sp>
+    </p:spTree>
+    <p:extLst>
+      <p:ext uri="{BB962C8B-B14F-4D97-AF65-F5344CB8AC3E}">
+        <p14:creationId xmlns:p14="http://schemas.microsoft.com/office/powerpoint/2010/main" val="40195535"/>
+      </p:ext>
+    </p:extLst>
+  </p:cSld>
+  <p:clrMapOvr>
+    <a:masterClrMapping/>
+  </p:clrMapOvr>
+</p:sld>
+</file>
+
 <file path=ppt/slides/slide2.xml><?xml version="1.0" encoding="utf-8"?>
 <p:sld xmlns:a="http://schemas.openxmlformats.org/drawingml/2006/main" xmlns:r="http://schemas.openxmlformats.org/officeDocument/2006/relationships" xmlns:p="http://schemas.openxmlformats.org/presentationml/2006/main">
   <p:cSld>
@@ -9445,7 +9792,32 @@
                   <a:schemeClr val="bg1"/>
                 </a:solidFill>
               </a:rPr>
-              <a:t>. With polished 3D graphics, the game lives up fierce space battles in a far future when greedy humankind fights each other for energy and resources.</a:t>
+              <a:t>. With polished 3D graphics, the game lives up fierce space battles in a far future when greedy humankind fights each other for energy and resources</a:t>
+            </a:r>
+            <a:r>
+              <a:rPr lang="vi-VN" sz="2000" dirty="0" smtClean="0">
+                <a:solidFill>
+                  <a:schemeClr val="bg1"/>
+                </a:solidFill>
+              </a:rPr>
+              <a:t>.</a:t>
+            </a:r>
+          </a:p>
+          <a:p>
+            <a:endParaRPr lang="vi-VN" sz="2000" dirty="0">
+              <a:solidFill>
+                <a:schemeClr val="bg1"/>
+              </a:solidFill>
+            </a:endParaRPr>
+          </a:p>
+          <a:p>
+            <a:r>
+              <a:rPr lang="vi-VN" sz="2000" dirty="0" smtClean="0">
+                <a:solidFill>
+                  <a:schemeClr val="bg1"/>
+                </a:solidFill>
+              </a:rPr>
+              <a:t>Target platforms: Windows 8 and Windows Phone 8.</a:t>
             </a:r>
             <a:endParaRPr lang="vi-VN" sz="2000" dirty="0">
               <a:solidFill>
@@ -9547,7 +9919,7 @@
                   <a:schemeClr val="bg1"/>
                 </a:solidFill>
               </a:rPr>
-              <a:t>The </a:t>
+              <a:t>The epic and heroic feeling when player directly controls the mothership fighting against </a:t>
             </a:r>
             <a:r>
               <a:rPr lang="vi-VN" sz="2000" dirty="0" smtClean="0">
@@ -9555,7 +9927,7 @@
                   <a:schemeClr val="bg1"/>
                 </a:solidFill>
               </a:rPr>
-              <a:t>epic and heroic </a:t>
+              <a:t>hundreds of </a:t>
             </a:r>
             <a:r>
               <a:rPr lang="vi-VN" sz="2000" dirty="0" smtClean="0">
@@ -9563,7 +9935,7 @@
                   <a:schemeClr val="bg1"/>
                 </a:solidFill>
               </a:rPr>
-              <a:t>feeling when player directly controls the mothership fighting against thousands of enemy ships in vast 3D space.</a:t>
+              <a:t>enemy ships in vast 3D space.</a:t>
             </a:r>
           </a:p>
           <a:p>
@@ -9583,7 +9955,23 @@
                   <a:schemeClr val="bg1"/>
                 </a:solidFill>
               </a:rPr>
-              <a:t>In addition, players can use bluetooth or wifi to play together in a breathetaking arms race to quell the Imperial expansionism.</a:t>
+              <a:t>In addition, players can use bluetooth or wifi to play together in a breathetaking </a:t>
+            </a:r>
+            <a:r>
+              <a:rPr lang="vi-VN" sz="2000" dirty="0" smtClean="0">
+                <a:solidFill>
+                  <a:schemeClr val="bg1"/>
+                </a:solidFill>
+              </a:rPr>
+              <a:t>arms-race </a:t>
+            </a:r>
+            <a:r>
+              <a:rPr lang="vi-VN" sz="2000" dirty="0" smtClean="0">
+                <a:solidFill>
+                  <a:schemeClr val="bg1"/>
+                </a:solidFill>
+              </a:rPr>
+              <a:t>to quell the Imperial expansionism.</a:t>
             </a:r>
             <a:endParaRPr lang="vi-VN" sz="2000" dirty="0"/>
           </a:p>
@@ -9953,8 +10341,45 @@
                   <a:schemeClr val="bg1"/>
                 </a:solidFill>
               </a:rPr>
-              <a:t>Realtime multiplayer. No need to wait others turn-by-turn.</a:t>
-            </a:r>
+              <a:t>Realtime </a:t>
+            </a:r>
+            <a:r>
+              <a:rPr lang="vi-VN" sz="2200" dirty="0" smtClean="0">
+                <a:solidFill>
+                  <a:schemeClr val="bg1"/>
+                </a:solidFill>
+              </a:rPr>
+              <a:t>multiplayer</a:t>
+            </a:r>
+            <a:r>
+              <a:rPr lang="vi-VN" sz="2200" dirty="0">
+                <a:solidFill>
+                  <a:schemeClr val="bg1"/>
+                </a:solidFill>
+              </a:rPr>
+              <a:t> </a:t>
+            </a:r>
+            <a:r>
+              <a:rPr lang="vi-VN" sz="2200" dirty="0" smtClean="0">
+                <a:solidFill>
+                  <a:schemeClr val="bg1"/>
+                </a:solidFill>
+              </a:rPr>
+              <a:t>with</a:t>
+            </a:r>
+            <a:r>
+              <a:rPr lang="vi-VN" sz="2200" dirty="0" smtClean="0">
+                <a:solidFill>
+                  <a:schemeClr val="bg1"/>
+                </a:solidFill>
+              </a:rPr>
+              <a:t> online competition.</a:t>
+            </a:r>
+            <a:endParaRPr lang="vi-VN" sz="2200" dirty="0" smtClean="0">
+              <a:solidFill>
+                <a:schemeClr val="bg1"/>
+              </a:solidFill>
+            </a:endParaRPr>
           </a:p>
           <a:p>
             <a:endParaRPr lang="vi-VN" sz="2200" dirty="0">
@@ -10711,6 +11136,562 @@
 </p:sld>
 </file>
 
+<file path=ppt/slides/slide6.xml><?xml version="1.0" encoding="utf-8"?>
+<p:sld xmlns:a="http://schemas.openxmlformats.org/drawingml/2006/main" xmlns:r="http://schemas.openxmlformats.org/officeDocument/2006/relationships" xmlns:p="http://schemas.openxmlformats.org/presentationml/2006/main">
+  <p:cSld>
+    <p:bg>
+      <p:bgPr>
+        <a:blipFill dpi="0" rotWithShape="1">
+          <a:blip r:embed="rId2">
+            <a:lum/>
+          </a:blip>
+          <a:srcRect/>
+          <a:stretch>
+            <a:fillRect l="-17000" r="-17000"/>
+          </a:stretch>
+        </a:blipFill>
+        <a:effectLst/>
+      </p:bgPr>
+    </p:bg>
+    <p:spTree>
+      <p:nvGrpSpPr>
+        <p:cNvPr id="1" name=""/>
+        <p:cNvGrpSpPr/>
+        <p:nvPr/>
+      </p:nvGrpSpPr>
+      <p:grpSpPr>
+        <a:xfrm>
+          <a:off x="0" y="0"/>
+          <a:ext cx="0" cy="0"/>
+          <a:chOff x="0" y="0"/>
+          <a:chExt cx="0" cy="0"/>
+        </a:xfrm>
+      </p:grpSpPr>
+      <p:sp>
+        <p:nvSpPr>
+          <p:cNvPr id="2" name="Title 1"/>
+          <p:cNvSpPr>
+            <a:spLocks noGrp="1"/>
+          </p:cNvSpPr>
+          <p:nvPr>
+            <p:ph type="title"/>
+          </p:nvPr>
+        </p:nvSpPr>
+        <p:spPr/>
+        <p:txBody>
+          <a:bodyPr/>
+          <a:lstStyle/>
+          <a:p>
+            <a:r>
+              <a:rPr lang="en-US" dirty="0" smtClean="0">
+                <a:solidFill>
+                  <a:schemeClr val="bg1"/>
+                </a:solidFill>
+              </a:rPr>
+              <a:t>The demo</a:t>
+            </a:r>
+            <a:endParaRPr lang="vi-VN" dirty="0">
+              <a:solidFill>
+                <a:schemeClr val="bg1"/>
+              </a:solidFill>
+            </a:endParaRPr>
+          </a:p>
+        </p:txBody>
+      </p:sp>
+      <p:sp>
+        <p:nvSpPr>
+          <p:cNvPr id="3" name="Content Placeholder 2"/>
+          <p:cNvSpPr>
+            <a:spLocks noGrp="1"/>
+          </p:cNvSpPr>
+          <p:nvPr>
+            <p:ph idx="1"/>
+          </p:nvPr>
+        </p:nvSpPr>
+        <p:spPr/>
+        <p:txBody>
+          <a:bodyPr/>
+          <a:lstStyle/>
+          <a:p>
+            <a:r>
+              <a:rPr lang="en-US" dirty="0" smtClean="0">
+                <a:solidFill>
+                  <a:schemeClr val="bg1"/>
+                </a:solidFill>
+                <a:effectLst>
+                  <a:outerShdw blurRad="38100" dist="38100" dir="2700000" algn="tl">
+                    <a:srgbClr val="000000">
+                      <a:alpha val="43137"/>
+                    </a:srgbClr>
+                  </a:outerShdw>
+                </a:effectLst>
+              </a:rPr>
+              <a:t>The demo runs on Windows.</a:t>
+            </a:r>
+          </a:p>
+          <a:p>
+            <a:r>
+              <a:rPr lang="en-US" dirty="0" smtClean="0">
+                <a:solidFill>
+                  <a:schemeClr val="bg1"/>
+                </a:solidFill>
+                <a:effectLst>
+                  <a:outerShdw blurRad="38100" dist="38100" dir="2700000" algn="tl">
+                    <a:srgbClr val="000000">
+                      <a:alpha val="43137"/>
+                    </a:srgbClr>
+                  </a:outerShdw>
+                </a:effectLst>
+              </a:rPr>
+              <a:t>Use mouse to aim, left click to shoot laser.</a:t>
+            </a:r>
+          </a:p>
+          <a:p>
+            <a:r>
+              <a:rPr lang="en-US" dirty="0" smtClean="0">
+                <a:solidFill>
+                  <a:schemeClr val="bg1"/>
+                </a:solidFill>
+                <a:effectLst>
+                  <a:outerShdw blurRad="38100" dist="38100" dir="2700000" algn="tl">
+                    <a:srgbClr val="000000">
+                      <a:alpha val="43137"/>
+                    </a:srgbClr>
+                  </a:outerShdw>
+                </a:effectLst>
+              </a:rPr>
+              <a:t>Press ESC to quit the game.</a:t>
+            </a:r>
+          </a:p>
+          <a:p>
+            <a:r>
+              <a:rPr lang="en-US" dirty="0" smtClean="0">
+                <a:solidFill>
+                  <a:schemeClr val="bg1"/>
+                </a:solidFill>
+                <a:effectLst>
+                  <a:outerShdw blurRad="38100" dist="38100" dir="2700000" algn="tl">
+                    <a:srgbClr val="000000">
+                      <a:alpha val="43137"/>
+                    </a:srgbClr>
+                  </a:outerShdw>
+                </a:effectLst>
+              </a:rPr>
+              <a:t>The demo is not yet a complete game, but it shows an epic battle, which is the core gameplay.</a:t>
+            </a:r>
+          </a:p>
+        </p:txBody>
+      </p:sp>
+    </p:spTree>
+    <p:extLst>
+      <p:ext uri="{BB962C8B-B14F-4D97-AF65-F5344CB8AC3E}">
+        <p14:creationId xmlns:p14="http://schemas.microsoft.com/office/powerpoint/2010/main" val="1528113043"/>
+      </p:ext>
+    </p:extLst>
+  </p:cSld>
+  <p:clrMapOvr>
+    <a:masterClrMapping/>
+  </p:clrMapOvr>
+</p:sld>
+</file>
+
+<file path=ppt/slides/slide7.xml><?xml version="1.0" encoding="utf-8"?>
+<p:sld xmlns:a="http://schemas.openxmlformats.org/drawingml/2006/main" xmlns:r="http://schemas.openxmlformats.org/officeDocument/2006/relationships" xmlns:p="http://schemas.openxmlformats.org/presentationml/2006/main">
+  <p:cSld>
+    <p:spTree>
+      <p:nvGrpSpPr>
+        <p:cNvPr id="1" name=""/>
+        <p:cNvGrpSpPr/>
+        <p:nvPr/>
+      </p:nvGrpSpPr>
+      <p:grpSpPr>
+        <a:xfrm>
+          <a:off x="0" y="0"/>
+          <a:ext cx="0" cy="0"/>
+          <a:chOff x="0" y="0"/>
+          <a:chExt cx="0" cy="0"/>
+        </a:xfrm>
+      </p:grpSpPr>
+      <p:sp>
+        <p:nvSpPr>
+          <p:cNvPr id="2" name="Title 1"/>
+          <p:cNvSpPr>
+            <a:spLocks noGrp="1"/>
+          </p:cNvSpPr>
+          <p:nvPr>
+            <p:ph type="title"/>
+          </p:nvPr>
+        </p:nvSpPr>
+        <p:spPr/>
+        <p:txBody>
+          <a:bodyPr/>
+          <a:lstStyle/>
+          <a:p>
+            <a:r>
+              <a:rPr lang="en-US" dirty="0" smtClean="0"/>
+              <a:t>Epic battles, yet easy to play!</a:t>
+            </a:r>
+            <a:endParaRPr lang="vi-VN" dirty="0"/>
+          </a:p>
+        </p:txBody>
+      </p:sp>
+      <p:sp>
+        <p:nvSpPr>
+          <p:cNvPr id="3" name="Content Placeholder 2"/>
+          <p:cNvSpPr>
+            <a:spLocks noGrp="1"/>
+          </p:cNvSpPr>
+          <p:nvPr>
+            <p:ph idx="1"/>
+          </p:nvPr>
+        </p:nvSpPr>
+        <p:spPr/>
+        <p:txBody>
+          <a:bodyPr/>
+          <a:lstStyle/>
+          <a:p>
+            <a:r>
+              <a:rPr lang="en-US" dirty="0" smtClean="0"/>
+              <a:t>Hundreds of ships fighting one another in big space.</a:t>
+            </a:r>
+          </a:p>
+          <a:p>
+            <a:r>
+              <a:rPr lang="en-US" dirty="0" smtClean="0"/>
+              <a:t>Player just aims the turret of mother ship and fire. The ship moves automatically to simplify the control.</a:t>
+            </a:r>
+            <a:endParaRPr lang="vi-VN" dirty="0"/>
+          </a:p>
+        </p:txBody>
+      </p:sp>
+      <p:pic>
+        <p:nvPicPr>
+          <p:cNvPr id="4" name="Picture 3"/>
+          <p:cNvPicPr>
+            <a:picLocks noChangeAspect="1"/>
+          </p:cNvPicPr>
+          <p:nvPr/>
+        </p:nvPicPr>
+        <p:blipFill>
+          <a:blip r:embed="rId2" cstate="print">
+            <a:extLst>
+              <a:ext uri="{28A0092B-C50C-407E-A947-70E740481C1C}">
+                <a14:useLocalDpi xmlns:a14="http://schemas.microsoft.com/office/drawing/2010/main" val="0"/>
+              </a:ext>
+            </a:extLst>
+          </a:blip>
+          <a:stretch>
+            <a:fillRect/>
+          </a:stretch>
+        </p:blipFill>
+        <p:spPr>
+          <a:xfrm>
+            <a:off x="4555208" y="4221088"/>
+            <a:ext cx="4427988" cy="2490743"/>
+          </a:xfrm>
+          <a:prstGeom prst="rect">
+            <a:avLst/>
+          </a:prstGeom>
+        </p:spPr>
+      </p:pic>
+    </p:spTree>
+    <p:extLst>
+      <p:ext uri="{BB962C8B-B14F-4D97-AF65-F5344CB8AC3E}">
+        <p14:creationId xmlns:p14="http://schemas.microsoft.com/office/powerpoint/2010/main" val="864911006"/>
+      </p:ext>
+    </p:extLst>
+  </p:cSld>
+  <p:clrMapOvr>
+    <a:masterClrMapping/>
+  </p:clrMapOvr>
+</p:sld>
+</file>
+
+<file path=ppt/slides/slide8.xml><?xml version="1.0" encoding="utf-8"?>
+<p:sld xmlns:a="http://schemas.openxmlformats.org/drawingml/2006/main" xmlns:r="http://schemas.openxmlformats.org/officeDocument/2006/relationships" xmlns:p="http://schemas.openxmlformats.org/presentationml/2006/main">
+  <p:cSld>
+    <p:bg>
+      <p:bgPr>
+        <a:blipFill dpi="0" rotWithShape="1">
+          <a:blip r:embed="rId2">
+            <a:lum/>
+          </a:blip>
+          <a:srcRect/>
+          <a:stretch>
+            <a:fillRect l="-17000" r="-17000"/>
+          </a:stretch>
+        </a:blipFill>
+        <a:effectLst/>
+      </p:bgPr>
+    </p:bg>
+    <p:spTree>
+      <p:nvGrpSpPr>
+        <p:cNvPr id="1" name=""/>
+        <p:cNvGrpSpPr/>
+        <p:nvPr/>
+      </p:nvGrpSpPr>
+      <p:grpSpPr>
+        <a:xfrm>
+          <a:off x="0" y="0"/>
+          <a:ext cx="0" cy="0"/>
+          <a:chOff x="0" y="0"/>
+          <a:chExt cx="0" cy="0"/>
+        </a:xfrm>
+      </p:grpSpPr>
+      <p:sp>
+        <p:nvSpPr>
+          <p:cNvPr id="2" name="Title 1"/>
+          <p:cNvSpPr>
+            <a:spLocks noGrp="1"/>
+          </p:cNvSpPr>
+          <p:nvPr>
+            <p:ph type="title"/>
+          </p:nvPr>
+        </p:nvSpPr>
+        <p:spPr/>
+        <p:txBody>
+          <a:bodyPr/>
+          <a:lstStyle/>
+          <a:p>
+            <a:r>
+              <a:rPr lang="en-US" dirty="0" smtClean="0">
+                <a:solidFill>
+                  <a:schemeClr val="bg1"/>
+                </a:solidFill>
+              </a:rPr>
+              <a:t>Casual game but high quality !</a:t>
+            </a:r>
+            <a:endParaRPr lang="vi-VN" dirty="0">
+              <a:solidFill>
+                <a:schemeClr val="bg1"/>
+              </a:solidFill>
+            </a:endParaRPr>
+          </a:p>
+        </p:txBody>
+      </p:sp>
+      <p:sp>
+        <p:nvSpPr>
+          <p:cNvPr id="3" name="Content Placeholder 2"/>
+          <p:cNvSpPr>
+            <a:spLocks noGrp="1"/>
+          </p:cNvSpPr>
+          <p:nvPr>
+            <p:ph idx="1"/>
+          </p:nvPr>
+        </p:nvSpPr>
+        <p:spPr/>
+        <p:txBody>
+          <a:bodyPr/>
+          <a:lstStyle/>
+          <a:p>
+            <a:r>
+              <a:rPr lang="en-US" dirty="0" smtClean="0">
+                <a:solidFill>
+                  <a:schemeClr val="bg1"/>
+                </a:solidFill>
+                <a:effectLst>
+                  <a:outerShdw blurRad="38100" dist="38100" dir="2700000" algn="tl">
+                    <a:srgbClr val="000000">
+                      <a:alpha val="43137"/>
+                    </a:srgbClr>
+                  </a:outerShdw>
+                </a:effectLst>
+              </a:rPr>
+              <a:t>Polished and shiny graphics.</a:t>
+            </a:r>
+          </a:p>
+          <a:p>
+            <a:r>
+              <a:rPr lang="en-US" dirty="0" smtClean="0">
+                <a:solidFill>
+                  <a:schemeClr val="bg1"/>
+                </a:solidFill>
+                <a:effectLst>
+                  <a:outerShdw blurRad="38100" dist="38100" dir="2700000" algn="tl">
+                    <a:srgbClr val="000000">
+                      <a:alpha val="43137"/>
+                    </a:srgbClr>
+                  </a:outerShdw>
+                </a:effectLst>
+              </a:rPr>
+              <a:t>3D sound effects.</a:t>
+            </a:r>
+          </a:p>
+          <a:p>
+            <a:r>
+              <a:rPr lang="en-US" dirty="0" smtClean="0">
+                <a:solidFill>
+                  <a:schemeClr val="bg1"/>
+                </a:solidFill>
+                <a:effectLst>
+                  <a:outerShdw blurRad="38100" dist="38100" dir="2700000" algn="tl">
+                    <a:srgbClr val="000000">
+                      <a:alpha val="43137"/>
+                    </a:srgbClr>
+                  </a:outerShdw>
+                </a:effectLst>
+              </a:rPr>
+              <a:t>High performance on Windows Phone devices.</a:t>
+            </a:r>
+          </a:p>
+          <a:p>
+            <a:endParaRPr lang="en-US" dirty="0" smtClean="0"/>
+          </a:p>
+        </p:txBody>
+      </p:sp>
+    </p:spTree>
+    <p:extLst>
+      <p:ext uri="{BB962C8B-B14F-4D97-AF65-F5344CB8AC3E}">
+        <p14:creationId xmlns:p14="http://schemas.microsoft.com/office/powerpoint/2010/main" val="4173658984"/>
+      </p:ext>
+    </p:extLst>
+  </p:cSld>
+  <p:clrMapOvr>
+    <a:masterClrMapping/>
+  </p:clrMapOvr>
+</p:sld>
+</file>
+
+<file path=ppt/slides/slide9.xml><?xml version="1.0" encoding="utf-8"?>
+<p:sld xmlns:a="http://schemas.openxmlformats.org/drawingml/2006/main" xmlns:r="http://schemas.openxmlformats.org/officeDocument/2006/relationships" xmlns:p="http://schemas.openxmlformats.org/presentationml/2006/main">
+  <p:cSld>
+    <p:spTree>
+      <p:nvGrpSpPr>
+        <p:cNvPr id="1" name=""/>
+        <p:cNvGrpSpPr/>
+        <p:nvPr/>
+      </p:nvGrpSpPr>
+      <p:grpSpPr>
+        <a:xfrm>
+          <a:off x="0" y="0"/>
+          <a:ext cx="0" cy="0"/>
+          <a:chOff x="0" y="0"/>
+          <a:chExt cx="0" cy="0"/>
+        </a:xfrm>
+      </p:grpSpPr>
+      <p:sp>
+        <p:nvSpPr>
+          <p:cNvPr id="2" name="Title 1"/>
+          <p:cNvSpPr>
+            <a:spLocks noGrp="1"/>
+          </p:cNvSpPr>
+          <p:nvPr>
+            <p:ph type="title"/>
+          </p:nvPr>
+        </p:nvSpPr>
+        <p:spPr/>
+        <p:txBody>
+          <a:bodyPr/>
+          <a:lstStyle/>
+          <a:p>
+            <a:r>
+              <a:rPr lang="en-US" dirty="0" smtClean="0"/>
+              <a:t>The game lives online</a:t>
+            </a:r>
+            <a:endParaRPr lang="vi-VN" dirty="0"/>
+          </a:p>
+        </p:txBody>
+      </p:sp>
+      <p:sp>
+        <p:nvSpPr>
+          <p:cNvPr id="3" name="Content Placeholder 2"/>
+          <p:cNvSpPr>
+            <a:spLocks noGrp="1"/>
+          </p:cNvSpPr>
+          <p:nvPr>
+            <p:ph idx="1"/>
+          </p:nvPr>
+        </p:nvSpPr>
+        <p:spPr/>
+        <p:txBody>
+          <a:bodyPr/>
+          <a:lstStyle/>
+          <a:p>
+            <a:r>
+              <a:rPr lang="en-US" dirty="0" smtClean="0"/>
+              <a:t>Players move their battle-fleet from planets to planets in a large cosmic adventure. Status of the planets is updated frequently online.</a:t>
+            </a:r>
+            <a:endParaRPr lang="vi-VN" dirty="0"/>
+          </a:p>
+        </p:txBody>
+      </p:sp>
+      <p:pic>
+        <p:nvPicPr>
+          <p:cNvPr id="1027" name="Picture 3"/>
+          <p:cNvPicPr>
+            <a:picLocks noChangeAspect="1" noChangeArrowheads="1"/>
+          </p:cNvPicPr>
+          <p:nvPr/>
+        </p:nvPicPr>
+        <p:blipFill>
+          <a:blip r:embed="rId2">
+            <a:extLst>
+              <a:ext uri="{28A0092B-C50C-407E-A947-70E740481C1C}">
+                <a14:useLocalDpi xmlns:a14="http://schemas.microsoft.com/office/drawing/2010/main" val="0"/>
+              </a:ext>
+            </a:extLst>
+          </a:blip>
+          <a:srcRect/>
+          <a:stretch>
+            <a:fillRect/>
+          </a:stretch>
+        </p:blipFill>
+        <p:spPr bwMode="auto">
+          <a:xfrm>
+            <a:off x="4524829" y="3356992"/>
+            <a:ext cx="4349987" cy="3276724"/>
+          </a:xfrm>
+          <a:prstGeom prst="rect">
+            <a:avLst/>
+          </a:prstGeom>
+          <a:noFill/>
+          <a:ln>
+            <a:noFill/>
+          </a:ln>
+          <a:effectLst/>
+          <a:extLst>
+            <a:ext uri="{909E8E84-426E-40DD-AFC4-6F175D3DCCD1}">
+              <a14:hiddenFill xmlns:a14="http://schemas.microsoft.com/office/drawing/2010/main">
+                <a:solidFill>
+                  <a:schemeClr val="accent1"/>
+                </a:solidFill>
+              </a14:hiddenFill>
+            </a:ext>
+            <a:ext uri="{91240B29-F687-4F45-9708-019B960494DF}">
+              <a14:hiddenLine xmlns:a14="http://schemas.microsoft.com/office/drawing/2010/main" w="9525">
+                <a:solidFill>
+                  <a:schemeClr val="tx1"/>
+                </a:solidFill>
+                <a:miter lim="800000"/>
+                <a:headEnd/>
+                <a:tailEnd/>
+              </a14:hiddenLine>
+            </a:ext>
+            <a:ext uri="{AF507438-7753-43E0-B8FC-AC1667EBCBE1}">
+              <a14:hiddenEffects xmlns:a14="http://schemas.microsoft.com/office/drawing/2010/main">
+                <a:effectLst>
+                  <a:outerShdw dist="35921" dir="2700000" algn="ctr" rotWithShape="0">
+                    <a:schemeClr val="bg2"/>
+                  </a:outerShdw>
+                </a:effectLst>
+              </a14:hiddenEffects>
+            </a:ext>
+          </a:extLst>
+        </p:spPr>
+      </p:pic>
+    </p:spTree>
+    <p:extLst>
+      <p:ext uri="{BB962C8B-B14F-4D97-AF65-F5344CB8AC3E}">
+        <p14:creationId xmlns:p14="http://schemas.microsoft.com/office/powerpoint/2010/main" val="302817411"/>
+      </p:ext>
+    </p:extLst>
+  </p:cSld>
+  <p:clrMapOvr>
+    <a:masterClrMapping/>
+  </p:clrMapOvr>
+</p:sld>
+</file>
+
 <file path=ppt/theme/theme1.xml><?xml version="1.0" encoding="utf-8"?>
 <a:theme xmlns:a="http://schemas.openxmlformats.org/drawingml/2006/main" name="Office Theme">
   <a:themeElements>

</xml_diff>